<commit_message>
portada, agenda y primera diapositiva en construccion
</commit_message>
<xml_diff>
--- a/presentacion-seminario.pptx
+++ b/presentacion-seminario.pptx
@@ -7,6 +7,7 @@
   <p:sldIdLst>
     <p:sldId id="256" r:id="rId2"/>
     <p:sldId id="257" r:id="rId3"/>
+    <p:sldId id="258" r:id="rId4"/>
   </p:sldIdLst>
   <p:sldSz cx="9144000" cy="6858000" type="screen4x3"/>
   <p:notesSz cx="6858000" cy="9144000"/>
@@ -289,7 +290,7 @@
           <a:p>
             <a:fld id="{D2DDAD97-A02C-4189-ADB0-D76FE58C7F5C}" type="datetimeFigureOut">
               <a:rPr lang="es-VE" smtClean="0"/>
-              <a:t>17/11/2013</a:t>
+              <a:t>18/11/2013</a:t>
             </a:fld>
             <a:endParaRPr lang="es-VE"/>
           </a:p>
@@ -459,7 +460,7 @@
           <a:p>
             <a:fld id="{D2DDAD97-A02C-4189-ADB0-D76FE58C7F5C}" type="datetimeFigureOut">
               <a:rPr lang="es-VE" smtClean="0"/>
-              <a:t>17/11/2013</a:t>
+              <a:t>18/11/2013</a:t>
             </a:fld>
             <a:endParaRPr lang="es-VE"/>
           </a:p>
@@ -639,7 +640,7 @@
           <a:p>
             <a:fld id="{D2DDAD97-A02C-4189-ADB0-D76FE58C7F5C}" type="datetimeFigureOut">
               <a:rPr lang="es-VE" smtClean="0"/>
-              <a:t>17/11/2013</a:t>
+              <a:t>18/11/2013</a:t>
             </a:fld>
             <a:endParaRPr lang="es-VE"/>
           </a:p>
@@ -809,7 +810,7 @@
           <a:p>
             <a:fld id="{D2DDAD97-A02C-4189-ADB0-D76FE58C7F5C}" type="datetimeFigureOut">
               <a:rPr lang="es-VE" smtClean="0"/>
-              <a:t>17/11/2013</a:t>
+              <a:t>18/11/2013</a:t>
             </a:fld>
             <a:endParaRPr lang="es-VE"/>
           </a:p>
@@ -1055,7 +1056,7 @@
           <a:p>
             <a:fld id="{D2DDAD97-A02C-4189-ADB0-D76FE58C7F5C}" type="datetimeFigureOut">
               <a:rPr lang="es-VE" smtClean="0"/>
-              <a:t>17/11/2013</a:t>
+              <a:t>18/11/2013</a:t>
             </a:fld>
             <a:endParaRPr lang="es-VE"/>
           </a:p>
@@ -1343,7 +1344,7 @@
           <a:p>
             <a:fld id="{D2DDAD97-A02C-4189-ADB0-D76FE58C7F5C}" type="datetimeFigureOut">
               <a:rPr lang="es-VE" smtClean="0"/>
-              <a:t>17/11/2013</a:t>
+              <a:t>18/11/2013</a:t>
             </a:fld>
             <a:endParaRPr lang="es-VE"/>
           </a:p>
@@ -1765,7 +1766,7 @@
           <a:p>
             <a:fld id="{D2DDAD97-A02C-4189-ADB0-D76FE58C7F5C}" type="datetimeFigureOut">
               <a:rPr lang="es-VE" smtClean="0"/>
-              <a:t>17/11/2013</a:t>
+              <a:t>18/11/2013</a:t>
             </a:fld>
             <a:endParaRPr lang="es-VE"/>
           </a:p>
@@ -1883,7 +1884,7 @@
           <a:p>
             <a:fld id="{D2DDAD97-A02C-4189-ADB0-D76FE58C7F5C}" type="datetimeFigureOut">
               <a:rPr lang="es-VE" smtClean="0"/>
-              <a:t>17/11/2013</a:t>
+              <a:t>18/11/2013</a:t>
             </a:fld>
             <a:endParaRPr lang="es-VE"/>
           </a:p>
@@ -1978,7 +1979,7 @@
           <a:p>
             <a:fld id="{D2DDAD97-A02C-4189-ADB0-D76FE58C7F5C}" type="datetimeFigureOut">
               <a:rPr lang="es-VE" smtClean="0"/>
-              <a:t>17/11/2013</a:t>
+              <a:t>18/11/2013</a:t>
             </a:fld>
             <a:endParaRPr lang="es-VE"/>
           </a:p>
@@ -2255,7 +2256,7 @@
           <a:p>
             <a:fld id="{D2DDAD97-A02C-4189-ADB0-D76FE58C7F5C}" type="datetimeFigureOut">
               <a:rPr lang="es-VE" smtClean="0"/>
-              <a:t>17/11/2013</a:t>
+              <a:t>18/11/2013</a:t>
             </a:fld>
             <a:endParaRPr lang="es-VE"/>
           </a:p>
@@ -2508,7 +2509,7 @@
           <a:p>
             <a:fld id="{D2DDAD97-A02C-4189-ADB0-D76FE58C7F5C}" type="datetimeFigureOut">
               <a:rPr lang="es-VE" smtClean="0"/>
-              <a:t>17/11/2013</a:t>
+              <a:t>18/11/2013</a:t>
             </a:fld>
             <a:endParaRPr lang="es-VE"/>
           </a:p>
@@ -2721,7 +2722,7 @@
           <a:p>
             <a:fld id="{D2DDAD97-A02C-4189-ADB0-D76FE58C7F5C}" type="datetimeFigureOut">
               <a:rPr lang="es-VE" smtClean="0"/>
-              <a:t>17/11/2013</a:t>
+              <a:t>18/11/2013</a:t>
             </a:fld>
             <a:endParaRPr lang="es-VE"/>
           </a:p>
@@ -3120,15 +3121,25 @@
           <a:p>
             <a:r>
               <a:rPr lang="es-VE" sz="3300" b="1"/>
-              <a:t>Escáner 3D Móvil utilizando Lego Mindstorms y Dispositivos Android </a:t>
-            </a:r>
-            <a:r>
-              <a:rPr lang="es-VE" sz="3300" b="1"/>
-              <a:t>en </a:t>
+              <a:t>Escáner 3D Móvil utilizando Lego Mindstorms y Dispositivos Android en </a:t>
             </a:r>
             <a:r>
               <a:rPr lang="es-VE" sz="3300" b="1" smtClean="0"/>
               <a:t>Red</a:t>
+            </a:r>
+            <a:br>
+              <a:rPr lang="es-VE" sz="3300" b="1" smtClean="0"/>
+            </a:br>
+            <a:r>
+              <a:rPr lang="es-VE" sz="3300" b="1" smtClean="0"/>
+              <a:t/>
+            </a:r>
+            <a:br>
+              <a:rPr lang="es-VE" sz="3300" b="1" smtClean="0"/>
+            </a:br>
+            <a:r>
+              <a:rPr lang="es-VE" sz="3300" b="1" smtClean="0"/>
+              <a:t>Seminario</a:t>
             </a:r>
             <a:endParaRPr lang="es-VE" sz="3300"/>
           </a:p>
@@ -3582,6 +3593,10 @@
           <a:bodyPr/>
           <a:lstStyle/>
           <a:p>
+            <a:r>
+              <a:rPr lang="en-US" smtClean="0"/>
+              <a:t>Agenda</a:t>
+            </a:r>
             <a:endParaRPr lang="es-VE"/>
           </a:p>
         </p:txBody>
@@ -3598,17 +3613,492 @@
         </p:nvSpPr>
         <p:spPr/>
         <p:txBody>
-          <a:bodyPr/>
-          <a:lstStyle/>
-          <a:p>
-            <a:endParaRPr lang="es-VE"/>
-          </a:p>
-        </p:txBody>
-      </p:sp>
+          <a:bodyPr numCol="2">
+            <a:normAutofit/>
+          </a:bodyPr>
+          <a:lstStyle/>
+          <a:p>
+            <a:pPr fontAlgn="base"/>
+            <a:r>
+              <a:rPr lang="es-VE"/>
+              <a:t>Lego Mindstorms</a:t>
+            </a:r>
+          </a:p>
+          <a:p>
+            <a:pPr lvl="1" fontAlgn="base"/>
+            <a:r>
+              <a:rPr lang="es-VE" sz="2000"/>
+              <a:t>Origen</a:t>
+            </a:r>
+          </a:p>
+          <a:p>
+            <a:pPr lvl="1" fontAlgn="base"/>
+            <a:r>
+              <a:rPr lang="es-VE" sz="2000"/>
+              <a:t>Detalles Técnicos</a:t>
+            </a:r>
+          </a:p>
+          <a:p>
+            <a:pPr lvl="1" fontAlgn="base"/>
+            <a:r>
+              <a:rPr lang="es-VE" sz="2000" smtClean="0"/>
+              <a:t>Alternativas</a:t>
+            </a:r>
+            <a:endParaRPr lang="es-VE" sz="2000"/>
+          </a:p>
+          <a:p>
+            <a:pPr fontAlgn="base"/>
+            <a:r>
+              <a:rPr lang="es-VE"/>
+              <a:t>Propuesta</a:t>
+            </a:r>
+          </a:p>
+          <a:p>
+            <a:pPr lvl="1" fontAlgn="base"/>
+            <a:r>
+              <a:rPr lang="es-VE" sz="2000"/>
+              <a:t>Motivación</a:t>
+            </a:r>
+          </a:p>
+          <a:p>
+            <a:pPr lvl="1" fontAlgn="base"/>
+            <a:r>
+              <a:rPr lang="es-VE" sz="2000"/>
+              <a:t>Objetivos</a:t>
+            </a:r>
+          </a:p>
+          <a:p>
+            <a:pPr lvl="1" fontAlgn="base"/>
+            <a:r>
+              <a:rPr lang="es-VE" sz="2000"/>
+              <a:t>Esquema</a:t>
+            </a:r>
+          </a:p>
+          <a:p>
+            <a:pPr lvl="1" fontAlgn="base"/>
+            <a:r>
+              <a:rPr lang="es-VE" sz="2000"/>
+              <a:t>Componentes Hardware</a:t>
+            </a:r>
+          </a:p>
+          <a:p>
+            <a:pPr lvl="1" fontAlgn="base"/>
+            <a:r>
+              <a:rPr lang="es-VE" sz="2000"/>
+              <a:t>Componentes Software</a:t>
+            </a:r>
+          </a:p>
+          <a:p>
+            <a:pPr lvl="1" fontAlgn="base"/>
+            <a:r>
+              <a:rPr lang="es-VE" sz="2000"/>
+              <a:t>Herramientas</a:t>
+            </a:r>
+          </a:p>
+          <a:p>
+            <a:pPr lvl="1" fontAlgn="base"/>
+            <a:r>
+              <a:rPr lang="es-VE" sz="2000" smtClean="0"/>
+              <a:t>Prototipos</a:t>
+            </a:r>
+            <a:endParaRPr lang="es-VE" sz="2000"/>
+          </a:p>
+        </p:txBody>
+      </p:sp>
+      <p:cxnSp>
+        <p:nvCxnSpPr>
+          <p:cNvPr id="3" name="Straight Connector 2"/>
+          <p:cNvCxnSpPr>
+            <a:stCxn id="5" idx="0"/>
+            <a:endCxn id="5" idx="2"/>
+          </p:cNvCxnSpPr>
+          <p:nvPr/>
+        </p:nvCxnSpPr>
+        <p:spPr>
+          <a:xfrm>
+            <a:off x="4572000" y="1600200"/>
+            <a:ext cx="0" cy="4525963"/>
+          </a:xfrm>
+          <a:prstGeom prst="line">
+            <a:avLst/>
+          </a:prstGeom>
+        </p:spPr>
+        <p:style>
+          <a:lnRef idx="1">
+            <a:schemeClr val="accent1"/>
+          </a:lnRef>
+          <a:fillRef idx="0">
+            <a:schemeClr val="accent1"/>
+          </a:fillRef>
+          <a:effectRef idx="0">
+            <a:schemeClr val="accent1"/>
+          </a:effectRef>
+          <a:fontRef idx="minor">
+            <a:schemeClr val="tx1"/>
+          </a:fontRef>
+        </p:style>
+      </p:cxnSp>
     </p:spTree>
     <p:extLst>
       <p:ext uri="{BB962C8B-B14F-4D97-AF65-F5344CB8AC3E}">
         <p14:creationId xmlns:p14="http://schemas.microsoft.com/office/powerpoint/2010/main" val="2320108639"/>
+      </p:ext>
+    </p:extLst>
+  </p:cSld>
+  <p:clrMapOvr>
+    <a:masterClrMapping/>
+  </p:clrMapOvr>
+</p:sld>
+</file>
+
+<file path=ppt/slides/slide3.xml><?xml version="1.0" encoding="utf-8"?>
+<p:sld xmlns:a="http://schemas.openxmlformats.org/drawingml/2006/main" xmlns:r="http://schemas.openxmlformats.org/officeDocument/2006/relationships" xmlns:p="http://schemas.openxmlformats.org/presentationml/2006/main">
+  <p:cSld>
+    <p:spTree>
+      <p:nvGrpSpPr>
+        <p:cNvPr id="1" name=""/>
+        <p:cNvGrpSpPr/>
+        <p:nvPr/>
+      </p:nvGrpSpPr>
+      <p:grpSpPr>
+        <a:xfrm>
+          <a:off x="0" y="0"/>
+          <a:ext cx="0" cy="0"/>
+          <a:chOff x="0" y="0"/>
+          <a:chExt cx="0" cy="0"/>
+        </a:xfrm>
+      </p:grpSpPr>
+      <p:sp>
+        <p:nvSpPr>
+          <p:cNvPr id="2" name="Title 1"/>
+          <p:cNvSpPr>
+            <a:spLocks noGrp="1"/>
+          </p:cNvSpPr>
+          <p:nvPr>
+            <p:ph type="title"/>
+          </p:nvPr>
+        </p:nvSpPr>
+        <p:spPr/>
+        <p:txBody>
+          <a:bodyPr/>
+          <a:lstStyle/>
+          <a:p>
+            <a:r>
+              <a:rPr lang="en-US" smtClean="0"/>
+              <a:t>Lego Mindstorms</a:t>
+            </a:r>
+            <a:endParaRPr lang="es-VE"/>
+          </a:p>
+        </p:txBody>
+      </p:sp>
+      <p:pic>
+        <p:nvPicPr>
+          <p:cNvPr id="10" name="Content Placeholder 9"/>
+          <p:cNvPicPr>
+            <a:picLocks noGrp="1" noChangeAspect="1"/>
+          </p:cNvPicPr>
+          <p:nvPr>
+            <p:ph idx="1"/>
+          </p:nvPr>
+        </p:nvPicPr>
+        <p:blipFill>
+          <a:blip r:embed="rId2">
+            <a:extLst>
+              <a:ext uri="{28A0092B-C50C-407E-A947-70E740481C1C}">
+                <a14:useLocalDpi xmlns:a14="http://schemas.microsoft.com/office/drawing/2010/main" val="0"/>
+              </a:ext>
+            </a:extLst>
+          </a:blip>
+          <a:stretch>
+            <a:fillRect/>
+          </a:stretch>
+        </p:blipFill>
+        <p:spPr>
+          <a:xfrm>
+            <a:off x="4851812" y="2464120"/>
+            <a:ext cx="3301588" cy="2565080"/>
+          </a:xfrm>
+          <a:prstGeom prst="rect">
+            <a:avLst/>
+          </a:prstGeom>
+          <a:ln>
+            <a:noFill/>
+          </a:ln>
+          <a:effectLst>
+            <a:outerShdw blurRad="292100" dist="139700" dir="2700000" algn="tl" rotWithShape="0">
+              <a:srgbClr val="333333">
+                <a:alpha val="65000"/>
+              </a:srgbClr>
+            </a:outerShdw>
+          </a:effectLst>
+        </p:spPr>
+      </p:pic>
+      <p:sp>
+        <p:nvSpPr>
+          <p:cNvPr id="9" name="Oval 8"/>
+          <p:cNvSpPr/>
+          <p:nvPr/>
+        </p:nvSpPr>
+        <p:spPr>
+          <a:xfrm>
+            <a:off x="1066800" y="1676400"/>
+            <a:ext cx="1981200" cy="1295400"/>
+          </a:xfrm>
+          <a:prstGeom prst="ellipse">
+            <a:avLst/>
+          </a:prstGeom>
+          <a:effectLst>
+            <a:outerShdw blurRad="50800" dist="38100" dir="2700000" algn="tl" rotWithShape="0">
+              <a:prstClr val="black">
+                <a:alpha val="40000"/>
+              </a:prstClr>
+            </a:outerShdw>
+          </a:effectLst>
+        </p:spPr>
+        <p:style>
+          <a:lnRef idx="2">
+            <a:schemeClr val="accent2"/>
+          </a:lnRef>
+          <a:fillRef idx="1">
+            <a:schemeClr val="lt1"/>
+          </a:fillRef>
+          <a:effectRef idx="0">
+            <a:schemeClr val="accent2"/>
+          </a:effectRef>
+          <a:fontRef idx="minor">
+            <a:schemeClr val="dk1"/>
+          </a:fontRef>
+        </p:style>
+        <p:txBody>
+          <a:bodyPr rtlCol="0" anchor="ctr"/>
+          <a:lstStyle/>
+          <a:p>
+            <a:pPr algn="ctr"/>
+            <a:r>
+              <a:rPr lang="en-US" smtClean="0"/>
+              <a:t>Lego</a:t>
+            </a:r>
+            <a:endParaRPr lang="es-VE"/>
+          </a:p>
+        </p:txBody>
+      </p:sp>
+      <p:sp>
+        <p:nvSpPr>
+          <p:cNvPr id="12" name="Oval 11"/>
+          <p:cNvSpPr/>
+          <p:nvPr/>
+        </p:nvSpPr>
+        <p:spPr>
+          <a:xfrm>
+            <a:off x="1066800" y="3124200"/>
+            <a:ext cx="1981200" cy="1295400"/>
+          </a:xfrm>
+          <a:prstGeom prst="ellipse">
+            <a:avLst/>
+          </a:prstGeom>
+          <a:effectLst>
+            <a:outerShdw blurRad="50800" dist="38100" dir="2700000" algn="tl" rotWithShape="0">
+              <a:prstClr val="black">
+                <a:alpha val="40000"/>
+              </a:prstClr>
+            </a:outerShdw>
+          </a:effectLst>
+        </p:spPr>
+        <p:style>
+          <a:lnRef idx="2">
+            <a:schemeClr val="accent1"/>
+          </a:lnRef>
+          <a:fillRef idx="1">
+            <a:schemeClr val="lt1"/>
+          </a:fillRef>
+          <a:effectRef idx="0">
+            <a:schemeClr val="accent1"/>
+          </a:effectRef>
+          <a:fontRef idx="minor">
+            <a:schemeClr val="dk1"/>
+          </a:fontRef>
+        </p:style>
+        <p:txBody>
+          <a:bodyPr rtlCol="0" anchor="ctr"/>
+          <a:lstStyle/>
+          <a:p>
+            <a:pPr algn="ctr"/>
+            <a:r>
+              <a:rPr lang="en-US" smtClean="0"/>
+              <a:t>MIT - ML</a:t>
+            </a:r>
+            <a:endParaRPr lang="es-VE"/>
+          </a:p>
+        </p:txBody>
+      </p:sp>
+      <p:sp>
+        <p:nvSpPr>
+          <p:cNvPr id="13" name="Oval 12"/>
+          <p:cNvSpPr/>
+          <p:nvPr/>
+        </p:nvSpPr>
+        <p:spPr>
+          <a:xfrm>
+            <a:off x="1066800" y="4617027"/>
+            <a:ext cx="1981200" cy="1295400"/>
+          </a:xfrm>
+          <a:prstGeom prst="ellipse">
+            <a:avLst/>
+          </a:prstGeom>
+          <a:effectLst>
+            <a:outerShdw blurRad="50800" dist="38100" dir="2700000" algn="tl" rotWithShape="0">
+              <a:prstClr val="black">
+                <a:alpha val="40000"/>
+              </a:prstClr>
+            </a:outerShdw>
+          </a:effectLst>
+        </p:spPr>
+        <p:style>
+          <a:lnRef idx="2">
+            <a:schemeClr val="accent6"/>
+          </a:lnRef>
+          <a:fillRef idx="1">
+            <a:schemeClr val="lt1"/>
+          </a:fillRef>
+          <a:effectRef idx="0">
+            <a:schemeClr val="accent6"/>
+          </a:effectRef>
+          <a:fontRef idx="minor">
+            <a:schemeClr val="dk1"/>
+          </a:fontRef>
+        </p:style>
+        <p:txBody>
+          <a:bodyPr rtlCol="0" anchor="ctr"/>
+          <a:lstStyle/>
+          <a:p>
+            <a:pPr algn="ctr"/>
+            <a:r>
+              <a:rPr lang="en-US" smtClean="0"/>
+              <a:t>RAPEALG</a:t>
+            </a:r>
+            <a:endParaRPr lang="es-VE"/>
+          </a:p>
+        </p:txBody>
+      </p:sp>
+      <p:cxnSp>
+        <p:nvCxnSpPr>
+          <p:cNvPr id="15" name="Elbow Connector 14"/>
+          <p:cNvCxnSpPr>
+            <a:stCxn id="9" idx="6"/>
+            <a:endCxn id="10" idx="1"/>
+          </p:cNvCxnSpPr>
+          <p:nvPr/>
+        </p:nvCxnSpPr>
+        <p:spPr>
+          <a:xfrm>
+            <a:off x="3048000" y="2324100"/>
+            <a:ext cx="1803812" cy="1422560"/>
+          </a:xfrm>
+          <a:prstGeom prst="bentConnector3">
+            <a:avLst>
+              <a:gd name="adj1" fmla="val 50000"/>
+            </a:avLst>
+          </a:prstGeom>
+          <a:ln>
+            <a:headEnd type="none" w="med" len="med"/>
+            <a:tailEnd type="none" w="med" len="med"/>
+          </a:ln>
+        </p:spPr>
+        <p:style>
+          <a:lnRef idx="2">
+            <a:schemeClr val="accent1"/>
+          </a:lnRef>
+          <a:fillRef idx="0">
+            <a:schemeClr val="accent1"/>
+          </a:fillRef>
+          <a:effectRef idx="1">
+            <a:schemeClr val="accent1"/>
+          </a:effectRef>
+          <a:fontRef idx="minor">
+            <a:schemeClr val="tx1"/>
+          </a:fontRef>
+        </p:style>
+      </p:cxnSp>
+      <p:cxnSp>
+        <p:nvCxnSpPr>
+          <p:cNvPr id="17" name="Elbow Connector 16"/>
+          <p:cNvCxnSpPr>
+            <a:stCxn id="12" idx="6"/>
+            <a:endCxn id="10" idx="1"/>
+          </p:cNvCxnSpPr>
+          <p:nvPr/>
+        </p:nvCxnSpPr>
+        <p:spPr>
+          <a:xfrm flipV="1">
+            <a:off x="3048000" y="3746660"/>
+            <a:ext cx="1803812" cy="25240"/>
+          </a:xfrm>
+          <a:prstGeom prst="bentConnector3">
+            <a:avLst/>
+          </a:prstGeom>
+          <a:ln>
+            <a:headEnd type="none" w="med" len="med"/>
+            <a:tailEnd type="none" w="med" len="med"/>
+          </a:ln>
+        </p:spPr>
+        <p:style>
+          <a:lnRef idx="2">
+            <a:schemeClr val="accent1"/>
+          </a:lnRef>
+          <a:fillRef idx="0">
+            <a:schemeClr val="accent1"/>
+          </a:fillRef>
+          <a:effectRef idx="1">
+            <a:schemeClr val="accent1"/>
+          </a:effectRef>
+          <a:fontRef idx="minor">
+            <a:schemeClr val="tx1"/>
+          </a:fontRef>
+        </p:style>
+      </p:cxnSp>
+      <p:cxnSp>
+        <p:nvCxnSpPr>
+          <p:cNvPr id="19" name="Elbow Connector 18"/>
+          <p:cNvCxnSpPr>
+            <a:stCxn id="13" idx="6"/>
+            <a:endCxn id="10" idx="1"/>
+          </p:cNvCxnSpPr>
+          <p:nvPr/>
+        </p:nvCxnSpPr>
+        <p:spPr>
+          <a:xfrm flipV="1">
+            <a:off x="3048000" y="3746660"/>
+            <a:ext cx="1803812" cy="1518067"/>
+          </a:xfrm>
+          <a:prstGeom prst="bentConnector3">
+            <a:avLst>
+              <a:gd name="adj1" fmla="val 50000"/>
+            </a:avLst>
+          </a:prstGeom>
+          <a:ln>
+            <a:headEnd type="none" w="med" len="med"/>
+            <a:tailEnd type="none" w="med" len="med"/>
+          </a:ln>
+        </p:spPr>
+        <p:style>
+          <a:lnRef idx="2">
+            <a:schemeClr val="accent1"/>
+          </a:lnRef>
+          <a:fillRef idx="0">
+            <a:schemeClr val="accent1"/>
+          </a:fillRef>
+          <a:effectRef idx="1">
+            <a:schemeClr val="accent1"/>
+          </a:effectRef>
+          <a:fontRef idx="minor">
+            <a:schemeClr val="tx1"/>
+          </a:fontRef>
+        </p:style>
+      </p:cxnSp>
+    </p:spTree>
+    <p:extLst>
+      <p:ext uri="{BB962C8B-B14F-4D97-AF65-F5344CB8AC3E}">
+        <p14:creationId xmlns:p14="http://schemas.microsoft.com/office/powerpoint/2010/main" val="1119314853"/>
       </p:ext>
     </p:extLst>
   </p:cSld>

</xml_diff>